<commit_message>
refactoring powerpoint: minor edits
</commit_message>
<xml_diff>
--- a/basics/7_refactoring/Refactoring_Code_Qualität_LS7_PYB.pptx
+++ b/basics/7_refactoring/Refactoring_Code_Qualität_LS7_PYB.pptx
@@ -6,20 +6,21 @@
   </p:sldMasterIdLst>
   <p:sldIdLst>
     <p:sldId id="256" r:id="rId5"/>
-    <p:sldId id="273" r:id="rId6"/>
-    <p:sldId id="258" r:id="rId7"/>
-    <p:sldId id="259" r:id="rId8"/>
-    <p:sldId id="275" r:id="rId9"/>
-    <p:sldId id="283" r:id="rId10"/>
-    <p:sldId id="282" r:id="rId11"/>
-    <p:sldId id="284" r:id="rId12"/>
-    <p:sldId id="285" r:id="rId13"/>
-    <p:sldId id="286" r:id="rId14"/>
-    <p:sldId id="260" r:id="rId15"/>
-    <p:sldId id="276" r:id="rId16"/>
-    <p:sldId id="277" r:id="rId17"/>
-    <p:sldId id="288" r:id="rId18"/>
-    <p:sldId id="287" r:id="rId19"/>
+    <p:sldId id="289" r:id="rId6"/>
+    <p:sldId id="273" r:id="rId7"/>
+    <p:sldId id="258" r:id="rId8"/>
+    <p:sldId id="259" r:id="rId9"/>
+    <p:sldId id="275" r:id="rId10"/>
+    <p:sldId id="283" r:id="rId11"/>
+    <p:sldId id="282" r:id="rId12"/>
+    <p:sldId id="284" r:id="rId13"/>
+    <p:sldId id="285" r:id="rId14"/>
+    <p:sldId id="286" r:id="rId15"/>
+    <p:sldId id="260" r:id="rId16"/>
+    <p:sldId id="276" r:id="rId17"/>
+    <p:sldId id="277" r:id="rId18"/>
+    <p:sldId id="288" r:id="rId19"/>
+    <p:sldId id="287" r:id="rId20"/>
   </p:sldIdLst>
   <p:sldSz cx="12192000" cy="6858000"/>
   <p:notesSz cx="6858000" cy="9144000"/>
@@ -8199,7 +8200,7 @@
           <a:p>
             <a:fld id="{B91B1E6C-F4A7-4D8E-A1BC-12C5BB738108}" type="datetimeFigureOut">
               <a:rPr lang="de-DE" smtClean="0"/>
-              <a:t>20.10.2025</a:t>
+              <a:t>15.12.2025</a:t>
             </a:fld>
             <a:endParaRPr lang="de-DE"/>
           </a:p>
@@ -11587,13 +11588,10 @@
               </a:spcAft>
             </a:pPr>
             <a:r>
-              <a:rPr lang="en-US" dirty="0" err="1"/>
-              <a:t>Sauberer</a:t>
-            </a:r>
-            <a:r>
-              <a:rPr lang="en-US" dirty="0"/>
-              <a:t> Python-Code gestalten</a:t>
-            </a:r>
+              <a:rPr lang="en-US"/>
+              <a:t>Python-Code sauberer gestalten</a:t>
+            </a:r>
+            <a:endParaRPr lang="en-US" dirty="0"/>
           </a:p>
         </p:txBody>
       </p:sp>
@@ -11651,6 +11649,343 @@
 </file>
 
 <file path=ppt/slides/slide10.xml><?xml version="1.0" encoding="utf-8"?>
+<p:sld xmlns:a="http://schemas.openxmlformats.org/drawingml/2006/main" xmlns:r="http://schemas.openxmlformats.org/officeDocument/2006/relationships" xmlns:p="http://schemas.openxmlformats.org/presentationml/2006/main">
+  <p:cSld>
+    <p:spTree>
+      <p:nvGrpSpPr>
+        <p:cNvPr id="1" name="">
+          <a:extLst>
+            <a:ext uri="{FF2B5EF4-FFF2-40B4-BE49-F238E27FC236}">
+              <a16:creationId xmlns:a16="http://schemas.microsoft.com/office/drawing/2014/main" id="{B4A6AF4C-C36B-B621-FA6A-144E19E6CF13}"/>
+            </a:ext>
+          </a:extLst>
+        </p:cNvPr>
+        <p:cNvGrpSpPr/>
+        <p:nvPr/>
+      </p:nvGrpSpPr>
+      <p:grpSpPr>
+        <a:xfrm>
+          <a:off x="0" y="0"/>
+          <a:ext cx="0" cy="0"/>
+          <a:chOff x="0" y="0"/>
+          <a:chExt cx="0" cy="0"/>
+        </a:xfrm>
+      </p:grpSpPr>
+      <p:sp>
+        <p:nvSpPr>
+          <p:cNvPr id="4" name="Textplatzhalter 3">
+            <a:extLst>
+              <a:ext uri="{FF2B5EF4-FFF2-40B4-BE49-F238E27FC236}">
+                <a16:creationId xmlns:a16="http://schemas.microsoft.com/office/drawing/2014/main" id="{203940B6-F0B4-FB4C-CAA3-09510C9688F8}"/>
+              </a:ext>
+            </a:extLst>
+          </p:cNvPr>
+          <p:cNvSpPr>
+            <a:spLocks noGrp="1"/>
+          </p:cNvSpPr>
+          <p:nvPr>
+            <p:ph type="body" sz="quarter" idx="10"/>
+          </p:nvPr>
+        </p:nvSpPr>
+        <p:spPr/>
+        <p:txBody>
+          <a:bodyPr/>
+          <a:lstStyle/>
+          <a:p>
+            <a:r>
+              <a:rPr lang="de-DE" dirty="0" err="1"/>
+              <a:t>Refactoring</a:t>
+            </a:r>
+            <a:r>
+              <a:rPr lang="de-DE" dirty="0"/>
+              <a:t> und Code-Qualität</a:t>
+            </a:r>
+          </a:p>
+          <a:p>
+            <a:endParaRPr lang="de-DE" dirty="0"/>
+          </a:p>
+        </p:txBody>
+      </p:sp>
+      <p:sp>
+        <p:nvSpPr>
+          <p:cNvPr id="5" name="Textplatzhalter 4">
+            <a:extLst>
+              <a:ext uri="{FF2B5EF4-FFF2-40B4-BE49-F238E27FC236}">
+                <a16:creationId xmlns:a16="http://schemas.microsoft.com/office/drawing/2014/main" id="{ACA06F4A-ABAD-E33A-BBFA-F39989207C81}"/>
+              </a:ext>
+            </a:extLst>
+          </p:cNvPr>
+          <p:cNvSpPr>
+            <a:spLocks noGrp="1"/>
+          </p:cNvSpPr>
+          <p:nvPr>
+            <p:ph type="body" sz="quarter" idx="11"/>
+          </p:nvPr>
+        </p:nvSpPr>
+        <p:spPr/>
+        <p:txBody>
+          <a:bodyPr/>
+          <a:lstStyle/>
+          <a:p>
+            <a:r>
+              <a:rPr lang="de-DE" sz="3200" b="1" dirty="0"/>
+              <a:t>Tipp 4: Komplexe Bedingungen vereinfachen</a:t>
+            </a:r>
+          </a:p>
+        </p:txBody>
+      </p:sp>
+      <p:sp>
+        <p:nvSpPr>
+          <p:cNvPr id="7" name="Rectangle: Rounded Corners 1">
+            <a:extLst>
+              <a:ext uri="{FF2B5EF4-FFF2-40B4-BE49-F238E27FC236}">
+                <a16:creationId xmlns:a16="http://schemas.microsoft.com/office/drawing/2014/main" id="{CC65B875-CFA7-E787-9228-CD0639641CE2}"/>
+              </a:ext>
+            </a:extLst>
+          </p:cNvPr>
+          <p:cNvSpPr/>
+          <p:nvPr/>
+        </p:nvSpPr>
+        <p:spPr>
+          <a:xfrm>
+            <a:off x="2349280" y="1504921"/>
+            <a:ext cx="1677406" cy="510254"/>
+          </a:xfrm>
+          <a:prstGeom prst="roundRect">
+            <a:avLst/>
+          </a:prstGeom>
+          <a:solidFill>
+            <a:srgbClr val="5500EB"/>
+          </a:solidFill>
+          <a:ln w="25400" cap="flat" cmpd="sng" algn="ctr">
+            <a:noFill/>
+            <a:prstDash val="solid"/>
+            <a:miter lim="800000"/>
+          </a:ln>
+          <a:effectLst>
+            <a:outerShdw dist="88900" dir="2700000" algn="tl" rotWithShape="0">
+              <a:srgbClr val="140046"/>
+            </a:outerShdw>
+          </a:effectLst>
+        </p:spPr>
+        <p:txBody>
+          <a:bodyPr lIns="288000" tIns="108000" rIns="288000" bIns="180000" rtlCol="0" anchor="ctr" anchorCtr="0"/>
+          <a:lstStyle/>
+          <a:p>
+            <a:pPr marL="0" marR="0" lvl="0" indent="0" algn="ctr" defTabSz="914400" eaLnBrk="1" fontAlgn="auto" latinLnBrk="0" hangingPunct="1">
+              <a:lnSpc>
+                <a:spcPct val="100000"/>
+              </a:lnSpc>
+              <a:spcBef>
+                <a:spcPts val="0"/>
+              </a:spcBef>
+              <a:spcAft>
+                <a:spcPts val="0"/>
+              </a:spcAft>
+              <a:buClrTx/>
+              <a:buSzTx/>
+              <a:buFontTx/>
+              <a:buNone/>
+              <a:tabLst/>
+              <a:defRPr/>
+            </a:pPr>
+            <a:r>
+              <a:rPr kumimoji="0" lang="de-DE" sz="2000" b="1" i="0" u="none" strike="noStrike" kern="0" cap="none" spc="0" normalizeH="0" baseline="0" noProof="0" dirty="0">
+                <a:ln>
+                  <a:noFill/>
+                </a:ln>
+                <a:solidFill>
+                  <a:srgbClr val="FFFFFF"/>
+                </a:solidFill>
+                <a:effectLst/>
+                <a:uLnTx/>
+                <a:uFillTx/>
+                <a:latin typeface="Rubik SemiBold" pitchFamily="2" charset="-79"/>
+                <a:ea typeface="+mn-ea"/>
+                <a:cs typeface="Rubik SemiBold" pitchFamily="2" charset="-79"/>
+              </a:rPr>
+              <a:t>Vorher</a:t>
+            </a:r>
+            <a:endParaRPr kumimoji="0" lang="en-US" sz="2000" b="0" i="0" u="none" strike="noStrike" kern="0" cap="none" spc="0" normalizeH="0" baseline="0" noProof="0" dirty="0">
+              <a:ln>
+                <a:noFill/>
+              </a:ln>
+              <a:solidFill>
+                <a:srgbClr val="000000"/>
+              </a:solidFill>
+              <a:effectLst/>
+              <a:uLnTx/>
+              <a:uFillTx/>
+              <a:latin typeface="Source Sans Pro Light" panose="020B0403030403020204" pitchFamily="34" charset="0"/>
+              <a:ea typeface="Source Sans Pro Light" panose="020B0403030403020204" pitchFamily="34" charset="0"/>
+              <a:cs typeface="Poppins" pitchFamily="2" charset="77"/>
+            </a:endParaRPr>
+          </a:p>
+        </p:txBody>
+      </p:sp>
+      <p:sp>
+        <p:nvSpPr>
+          <p:cNvPr id="9" name="Rectangle: Rounded Corners 1">
+            <a:extLst>
+              <a:ext uri="{FF2B5EF4-FFF2-40B4-BE49-F238E27FC236}">
+                <a16:creationId xmlns:a16="http://schemas.microsoft.com/office/drawing/2014/main" id="{0227D314-F3ED-DFA6-41B0-CB776E098F5C}"/>
+              </a:ext>
+            </a:extLst>
+          </p:cNvPr>
+          <p:cNvSpPr/>
+          <p:nvPr/>
+        </p:nvSpPr>
+        <p:spPr>
+          <a:xfrm>
+            <a:off x="8485864" y="1488114"/>
+            <a:ext cx="1677406" cy="543869"/>
+          </a:xfrm>
+          <a:prstGeom prst="roundRect">
+            <a:avLst/>
+          </a:prstGeom>
+          <a:solidFill>
+            <a:srgbClr val="5500EB"/>
+          </a:solidFill>
+          <a:ln w="25400" cap="flat" cmpd="sng" algn="ctr">
+            <a:noFill/>
+            <a:prstDash val="solid"/>
+            <a:miter lim="800000"/>
+          </a:ln>
+          <a:effectLst>
+            <a:outerShdw dist="88900" dir="2700000" algn="tl" rotWithShape="0">
+              <a:srgbClr val="140046"/>
+            </a:outerShdw>
+          </a:effectLst>
+        </p:spPr>
+        <p:txBody>
+          <a:bodyPr lIns="288000" tIns="108000" rIns="288000" bIns="180000" rtlCol="0" anchor="ctr" anchorCtr="0"/>
+          <a:lstStyle/>
+          <a:p>
+            <a:pPr marL="0" marR="0" lvl="0" indent="0" algn="ctr" defTabSz="914400" eaLnBrk="1" fontAlgn="auto" latinLnBrk="0" hangingPunct="1">
+              <a:lnSpc>
+                <a:spcPct val="100000"/>
+              </a:lnSpc>
+              <a:spcBef>
+                <a:spcPts val="0"/>
+              </a:spcBef>
+              <a:spcAft>
+                <a:spcPts val="0"/>
+              </a:spcAft>
+              <a:buClrTx/>
+              <a:buSzTx/>
+              <a:buFontTx/>
+              <a:buNone/>
+              <a:tabLst/>
+              <a:defRPr/>
+            </a:pPr>
+            <a:r>
+              <a:rPr kumimoji="0" lang="de-DE" sz="2000" b="1" i="0" u="none" strike="noStrike" kern="0" cap="none" spc="0" normalizeH="0" baseline="0" noProof="0" dirty="0">
+                <a:ln>
+                  <a:noFill/>
+                </a:ln>
+                <a:solidFill>
+                  <a:srgbClr val="FFFFFF"/>
+                </a:solidFill>
+                <a:effectLst/>
+                <a:uLnTx/>
+                <a:uFillTx/>
+                <a:latin typeface="Rubik SemiBold" pitchFamily="2" charset="-79"/>
+                <a:ea typeface="+mn-ea"/>
+                <a:cs typeface="Rubik SemiBold" pitchFamily="2" charset="-79"/>
+              </a:rPr>
+              <a:t>Nachher</a:t>
+            </a:r>
+            <a:endParaRPr kumimoji="0" lang="en-US" sz="2000" b="0" i="0" u="none" strike="noStrike" kern="0" cap="none" spc="0" normalizeH="0" baseline="0" noProof="0" dirty="0">
+              <a:ln>
+                <a:noFill/>
+              </a:ln>
+              <a:solidFill>
+                <a:srgbClr val="000000"/>
+              </a:solidFill>
+              <a:effectLst/>
+              <a:uLnTx/>
+              <a:uFillTx/>
+              <a:latin typeface="Source Sans Pro Light" panose="020B0403030403020204" pitchFamily="34" charset="0"/>
+              <a:ea typeface="Source Sans Pro Light" panose="020B0403030403020204" pitchFamily="34" charset="0"/>
+              <a:cs typeface="Poppins" pitchFamily="2" charset="77"/>
+            </a:endParaRPr>
+          </a:p>
+        </p:txBody>
+      </p:sp>
+      <p:pic>
+        <p:nvPicPr>
+          <p:cNvPr id="6" name="Grafik 5">
+            <a:extLst>
+              <a:ext uri="{FF2B5EF4-FFF2-40B4-BE49-F238E27FC236}">
+                <a16:creationId xmlns:a16="http://schemas.microsoft.com/office/drawing/2014/main" id="{42064E9D-E1D3-1282-2D03-7D0EAFB1B354}"/>
+              </a:ext>
+            </a:extLst>
+          </p:cNvPr>
+          <p:cNvPicPr>
+            <a:picLocks noChangeAspect="1"/>
+          </p:cNvPicPr>
+          <p:nvPr/>
+        </p:nvPicPr>
+        <p:blipFill>
+          <a:blip r:embed="rId2"/>
+          <a:stretch>
+            <a:fillRect/>
+          </a:stretch>
+        </p:blipFill>
+        <p:spPr>
+          <a:xfrm>
+            <a:off x="406295" y="2031983"/>
+            <a:ext cx="5563376" cy="1467055"/>
+          </a:xfrm>
+          <a:prstGeom prst="rect">
+            <a:avLst/>
+          </a:prstGeom>
+        </p:spPr>
+      </p:pic>
+      <p:pic>
+        <p:nvPicPr>
+          <p:cNvPr id="11" name="Grafik 10">
+            <a:extLst>
+              <a:ext uri="{FF2B5EF4-FFF2-40B4-BE49-F238E27FC236}">
+                <a16:creationId xmlns:a16="http://schemas.microsoft.com/office/drawing/2014/main" id="{A1C1A260-0AEA-877D-EB37-B3568D2949F9}"/>
+              </a:ext>
+            </a:extLst>
+          </p:cNvPr>
+          <p:cNvPicPr>
+            <a:picLocks noChangeAspect="1"/>
+          </p:cNvPicPr>
+          <p:nvPr/>
+        </p:nvPicPr>
+        <p:blipFill>
+          <a:blip r:embed="rId3"/>
+          <a:stretch>
+            <a:fillRect/>
+          </a:stretch>
+        </p:blipFill>
+        <p:spPr>
+          <a:xfrm>
+            <a:off x="6569884" y="2015175"/>
+            <a:ext cx="5306165" cy="1781424"/>
+          </a:xfrm>
+          <a:prstGeom prst="rect">
+            <a:avLst/>
+          </a:prstGeom>
+        </p:spPr>
+      </p:pic>
+    </p:spTree>
+    <p:extLst>
+      <p:ext uri="{BB962C8B-B14F-4D97-AF65-F5344CB8AC3E}">
+        <p14:creationId xmlns:p14="http://schemas.microsoft.com/office/powerpoint/2010/main" val="1430450449"/>
+      </p:ext>
+    </p:extLst>
+  </p:cSld>
+  <p:clrMapOvr>
+    <a:masterClrMapping/>
+  </p:clrMapOvr>
+</p:sld>
+</file>
+
+<file path=ppt/slides/slide11.xml><?xml version="1.0" encoding="utf-8"?>
 <p:sld xmlns:a="http://schemas.openxmlformats.org/drawingml/2006/main" xmlns:r="http://schemas.openxmlformats.org/officeDocument/2006/relationships" xmlns:p="http://schemas.openxmlformats.org/presentationml/2006/main">
   <p:cSld>
     <p:spTree>
@@ -11995,7 +12330,7 @@
 </p:sld>
 </file>
 
-<file path=ppt/slides/slide11.xml><?xml version="1.0" encoding="utf-8"?>
+<file path=ppt/slides/slide12.xml><?xml version="1.0" encoding="utf-8"?>
 <p:sld xmlns:a="http://schemas.openxmlformats.org/drawingml/2006/main" xmlns:r="http://schemas.openxmlformats.org/officeDocument/2006/relationships" xmlns:p="http://schemas.openxmlformats.org/presentationml/2006/main">
   <p:cSld>
     <p:spTree>
@@ -12101,11 +12436,31 @@
               <a:t>:</a:t>
             </a:r>
             <a:br>
+              <a:rPr lang="de-DE" sz="1800"/>
+            </a:br>
+            <a:r>
+              <a:rPr lang="de-DE" sz="1800"/>
+              <a:t>Best Practice </a:t>
+            </a:r>
+            <a:r>
               <a:rPr lang="de-DE" sz="1800" dirty="0"/>
-            </a:br>
+              <a:t>aus dem Testgetriebenen Entwickeln </a:t>
+            </a:r>
+            <a:r>
+              <a:rPr lang="de-DE" sz="1800"/>
+              <a:t>(TDD, </a:t>
+            </a:r>
+            <a:r>
+              <a:rPr lang="de-DE" sz="1800" i="1"/>
+              <a:t>„test driven development“</a:t>
+            </a:r>
+            <a:r>
+              <a:rPr lang="de-DE" sz="1800"/>
+              <a:t>), </a:t>
+            </a:r>
             <a:r>
               <a:rPr lang="de-DE" sz="1800" dirty="0"/>
-              <a:t>Best-Practice aus dem Testgetriebenen Entwickeln (TDD), auch fester Bestandteil agiler Methoden:</a:t>
+              <a:t>auch fester Bestandteil agiler Methoden:</a:t>
             </a:r>
           </a:p>
           <a:p>
@@ -12246,7 +12601,7 @@
 </p:sld>
 </file>
 
-<file path=ppt/slides/slide12.xml><?xml version="1.0" encoding="utf-8"?>
+<file path=ppt/slides/slide13.xml><?xml version="1.0" encoding="utf-8"?>
 <p:sld xmlns:a="http://schemas.openxmlformats.org/drawingml/2006/main" xmlns:r="http://schemas.openxmlformats.org/officeDocument/2006/relationships" xmlns:p="http://schemas.openxmlformats.org/presentationml/2006/main">
   <p:cSld>
     <p:spTree>
@@ -12359,8 +12714,23 @@
           <a:lstStyle/>
           <a:p>
             <a:r>
+              <a:rPr lang="de-DE"/>
+              <a:t>PEP = </a:t>
+            </a:r>
+            <a:r>
+              <a:rPr lang="de-DE" i="1"/>
+              <a:t>Python Enhancement Proposals</a:t>
+            </a:r>
+            <a:endParaRPr lang="de-DE"/>
+          </a:p>
+          <a:p>
+            <a:r>
+              <a:rPr lang="de-DE"/>
+              <a:t>PEP </a:t>
+            </a:r>
+            <a:r>
               <a:rPr lang="de-DE" dirty="0"/>
-              <a:t>PEP 8 ist der </a:t>
+              <a:t>8 ist der </a:t>
             </a:r>
             <a:r>
               <a:rPr lang="de-DE" b="1" dirty="0"/>
@@ -12382,8 +12752,13 @@
             <a:pPr lvl="1"/>
             <a:r>
               <a:rPr lang="de-DE" dirty="0"/>
-              <a:t>Macht Code vertraut und leicht zu lesen – unabhängig vom Projekt</a:t>
-            </a:r>
+              <a:t>Macht Code vertraut und leicht zu lesen – unabhängig </a:t>
+            </a:r>
+            <a:r>
+              <a:rPr lang="de-DE"/>
+              <a:t>vom Projekt</a:t>
+            </a:r>
+            <a:endParaRPr lang="de-DE" dirty="0"/>
           </a:p>
           <a:p>
             <a:r>
@@ -12401,8 +12776,12 @@
           <a:p>
             <a:pPr lvl="1"/>
             <a:r>
+              <a:rPr lang="de-DE"/>
+              <a:t>Bessere </a:t>
+            </a:r>
+            <a:r>
               <a:rPr lang="de-DE" dirty="0"/>
-              <a:t>Besseres Code-Review, leichterer Einstieg für Außenstehende</a:t>
+              <a:t>Code-Review, leichterer Einstieg für Außenstehende</a:t>
             </a:r>
           </a:p>
           <a:p>
@@ -12845,7 +13224,7 @@
 </p:sld>
 </file>
 
-<file path=ppt/slides/slide13.xml><?xml version="1.0" encoding="utf-8"?>
+<file path=ppt/slides/slide14.xml><?xml version="1.0" encoding="utf-8"?>
 <p:sld xmlns:a="http://schemas.openxmlformats.org/drawingml/2006/main" xmlns:r="http://schemas.openxmlformats.org/officeDocument/2006/relationships" xmlns:p="http://schemas.openxmlformats.org/presentationml/2006/main">
   <p:cSld>
     <p:spTree>
@@ -12958,103 +13337,193 @@
           <a:lstStyle/>
           <a:p>
             <a:r>
-              <a:rPr lang="de-DE" sz="2000" b="1" dirty="0"/>
+              <a:rPr lang="de-DE" sz="1600" b="1" dirty="0"/>
               <a:t>Einrückung:</a:t>
             </a:r>
             <a:r>
-              <a:rPr lang="de-DE" sz="2000" dirty="0"/>
+              <a:rPr lang="de-DE" sz="1600" dirty="0"/>
               <a:t> 4 Leerzeichen pro Ebene, keine Tabs verwenden</a:t>
             </a:r>
           </a:p>
           <a:p>
             <a:r>
-              <a:rPr lang="de-DE" sz="2000" b="1" dirty="0"/>
+              <a:rPr lang="de-DE" sz="1600" b="1" dirty="0"/>
               <a:t>Zeilenlänge:</a:t>
             </a:r>
             <a:r>
-              <a:rPr lang="de-DE" sz="2000" dirty="0"/>
-              <a:t> Maximal 79 Zeichen; für Kommentare oder Tests auch länger möglich</a:t>
-            </a:r>
-          </a:p>
-          <a:p>
-            <a:r>
-              <a:rPr lang="de-DE" sz="2000" b="1" dirty="0"/>
+              <a:rPr lang="de-DE" sz="1600" dirty="0"/>
+              <a:t> Maximal </a:t>
+            </a:r>
+            <a:r>
+              <a:rPr lang="de-DE" sz="1600"/>
+              <a:t>79 Zeichen</a:t>
+            </a:r>
+          </a:p>
+          <a:p>
+            <a:pPr lvl="1"/>
+            <a:r>
+              <a:rPr lang="de-DE" sz="1600"/>
+              <a:t>(nutzt Zeilenumbrüche, insbesondere für Auflistungen und Funktionsparameter!)</a:t>
+            </a:r>
+          </a:p>
+          <a:p>
+            <a:pPr lvl="1"/>
+            <a:r>
+              <a:rPr lang="de-DE" sz="1600"/>
+              <a:t>für </a:t>
+            </a:r>
+            <a:r>
+              <a:rPr lang="de-DE" sz="1600" dirty="0"/>
+              <a:t>Kommentare oder Tests auch länger möglich</a:t>
+            </a:r>
+          </a:p>
+          <a:p>
+            <a:r>
+              <a:rPr lang="de-DE" sz="1600" b="1" dirty="0"/>
               <a:t>Leerzeilen:</a:t>
             </a:r>
             <a:r>
-              <a:rPr lang="de-DE" sz="2000" dirty="0"/>
-              <a:t> Trenne Klassen und Funktionen zur besseren Übersicht</a:t>
-            </a:r>
-          </a:p>
-          <a:p>
-            <a:r>
-              <a:rPr lang="de-DE" sz="2000" b="1" dirty="0"/>
-              <a:t>Importe:</a:t>
-            </a:r>
-            <a:r>
-              <a:rPr lang="de-DE" sz="2000" dirty="0"/>
-              <a:t> Erst Standardbibliothek, dann externe Pakete, dann lokale Importe</a:t>
-            </a:r>
-          </a:p>
-          <a:p>
-            <a:r>
-              <a:rPr lang="de-DE" sz="2000" b="1" dirty="0"/>
-              <a:t>Namenskonventionen:</a:t>
-            </a:r>
-            <a:r>
-              <a:rPr lang="de-DE" sz="2000" dirty="0"/>
+              <a:rPr lang="de-DE" sz="1600" dirty="0"/>
+              <a:t> Trenne Klassen und Funktionen zur </a:t>
+            </a:r>
+            <a:r>
+              <a:rPr lang="de-DE" sz="1600"/>
+              <a:t>besseren Übersicht</a:t>
+            </a:r>
+          </a:p>
+          <a:p>
+            <a:r>
+              <a:rPr lang="de-DE" sz="1600" b="1"/>
+              <a:t>Importe: </a:t>
+            </a:r>
+            <a:r>
+              <a:rPr lang="de-DE" sz="1600"/>
+              <a:t>Gesammelt zu Beginn des Notebooks/Skripts</a:t>
+            </a:r>
+          </a:p>
+          <a:p>
+            <a:pPr lvl="1"/>
+            <a:r>
+              <a:rPr lang="de-DE" sz="1600"/>
+              <a:t>Erst </a:t>
+            </a:r>
+            <a:r>
+              <a:rPr lang="de-DE" sz="1600" dirty="0"/>
+              <a:t>Standardbibliothek, dann externe Pakete, dann lokale Importe</a:t>
+            </a:r>
+          </a:p>
+          <a:p>
+            <a:r>
+              <a:rPr lang="de-DE" sz="1600" b="1" dirty="0"/>
+              <a:t>Namenskonventionen</a:t>
+            </a:r>
+            <a:r>
+              <a:rPr lang="de-DE" sz="1600" b="1"/>
+              <a:t>:</a:t>
+            </a:r>
+            <a:r>
+              <a:rPr lang="de-DE" sz="1600"/>
               <a:t> </a:t>
             </a:r>
-            <a:r>
-              <a:rPr lang="de-DE" sz="2000" b="1" dirty="0"/>
+          </a:p>
+          <a:p>
+            <a:pPr lvl="1"/>
+            <a:r>
+              <a:rPr lang="de-DE" sz="1200" b="1">
+                <a:latin typeface="JetBrains Mono NL" panose="02000009000000000000" pitchFamily="49" charset="0"/>
+                <a:ea typeface="JetBrains Mono NL" panose="02000009000000000000" pitchFamily="49" charset="0"/>
+                <a:cs typeface="JetBrains Mono NL" panose="02000009000000000000" pitchFamily="49" charset="0"/>
+              </a:rPr>
               <a:t>snake_case</a:t>
             </a:r>
             <a:r>
-              <a:rPr lang="de-DE" sz="2000" dirty="0"/>
-              <a:t> für Variablen und Funktionen, </a:t>
-            </a:r>
-            <a:r>
-              <a:rPr lang="de-DE" sz="2000" b="1" dirty="0"/>
+              <a:rPr lang="de-DE" sz="1200"/>
+              <a:t> für Variablen und Funktionen</a:t>
+            </a:r>
+          </a:p>
+          <a:p>
+            <a:pPr lvl="1"/>
+            <a:r>
+              <a:rPr lang="de-DE" sz="1200" b="1">
+                <a:latin typeface="JetBrains Mono NL" panose="02000009000000000000" pitchFamily="49" charset="0"/>
+                <a:ea typeface="JetBrains Mono NL" panose="02000009000000000000" pitchFamily="49" charset="0"/>
+                <a:cs typeface="JetBrains Mono NL" panose="02000009000000000000" pitchFamily="49" charset="0"/>
+              </a:rPr>
               <a:t>CamelCase</a:t>
             </a:r>
             <a:r>
-              <a:rPr lang="de-DE" sz="2000" dirty="0"/>
-              <a:t> für Klassen, </a:t>
-            </a:r>
-            <a:r>
-              <a:rPr lang="de-DE" sz="2000" b="1" dirty="0"/>
+              <a:rPr lang="de-DE" sz="1200"/>
+              <a:t> für Klassen</a:t>
+            </a:r>
+          </a:p>
+          <a:p>
+            <a:pPr lvl="1"/>
+            <a:r>
+              <a:rPr lang="de-DE" sz="1200" b="1">
+                <a:latin typeface="JetBrains Mono NL" panose="02000009000000000000" pitchFamily="49" charset="0"/>
+                <a:ea typeface="JetBrains Mono NL" panose="02000009000000000000" pitchFamily="49" charset="0"/>
+                <a:cs typeface="JetBrains Mono NL" panose="02000009000000000000" pitchFamily="49" charset="0"/>
+              </a:rPr>
               <a:t>UPPER_CASE</a:t>
             </a:r>
             <a:r>
-              <a:rPr lang="de-DE" sz="2000" dirty="0"/>
+              <a:rPr lang="de-DE" sz="1200"/>
               <a:t> für Konstanten</a:t>
             </a:r>
           </a:p>
           <a:p>
             <a:r>
-              <a:rPr lang="de-DE" sz="2000" b="1" dirty="0"/>
-              <a:t>Abstände:</a:t>
-            </a:r>
-            <a:r>
-              <a:rPr lang="de-DE" sz="2000" dirty="0"/>
-              <a:t> Leerzeichen um Operatoren und nach Kommas; </a:t>
-            </a:r>
-            <a:r>
-              <a:rPr lang="de-DE" sz="2000" b="1" dirty="0"/>
-              <a:t>kein</a:t>
-            </a:r>
-            <a:r>
-              <a:rPr lang="de-DE" sz="2000" dirty="0"/>
-              <a:t> Leerzeichen um Standardwerte (</a:t>
-            </a:r>
-            <a:r>
-              <a:rPr lang="de-DE" sz="2000" b="1" dirty="0"/>
-              <a:t>def foo(x=42)</a:t>
-            </a:r>
-            <a:r>
-              <a:rPr lang="de-DE" sz="2000" dirty="0"/>
-              <a:t>)</a:t>
-            </a:r>
+              <a:rPr lang="de-DE" sz="1600" b="1"/>
+              <a:t>Abstände</a:t>
+            </a:r>
+            <a:r>
+              <a:rPr lang="de-DE" sz="1600" b="1" dirty="0"/>
+              <a:t>:</a:t>
+            </a:r>
+            <a:r>
+              <a:rPr lang="de-DE" sz="1600" dirty="0"/>
+              <a:t> Leerzeichen um Operatoren und </a:t>
+            </a:r>
+            <a:r>
+              <a:rPr lang="de-DE" sz="1600"/>
+              <a:t>nach Kommas</a:t>
+            </a:r>
+          </a:p>
+          <a:p>
+            <a:pPr lvl="1"/>
+            <a:r>
+              <a:rPr lang="de-DE" sz="1200" b="1"/>
+              <a:t>Ausnahme: Kein</a:t>
+            </a:r>
+            <a:r>
+              <a:rPr lang="de-DE" sz="1200"/>
+              <a:t> Leerzeichen für Standardwerte: </a:t>
+            </a:r>
+            <a:r>
+              <a:rPr lang="de-DE" sz="1200" b="1">
+                <a:latin typeface="JetBrains Mono NL" panose="02000009000000000000" pitchFamily="49" charset="0"/>
+                <a:ea typeface="JetBrains Mono NL" panose="02000009000000000000" pitchFamily="49" charset="0"/>
+                <a:cs typeface="JetBrains Mono NL" panose="02000009000000000000" pitchFamily="49" charset="0"/>
+              </a:rPr>
+              <a:t>def </a:t>
+            </a:r>
+            <a:r>
+              <a:rPr lang="de-DE" sz="1200" b="1" dirty="0">
+                <a:latin typeface="JetBrains Mono NL" panose="02000009000000000000" pitchFamily="49" charset="0"/>
+                <a:ea typeface="JetBrains Mono NL" panose="02000009000000000000" pitchFamily="49" charset="0"/>
+                <a:cs typeface="JetBrains Mono NL" panose="02000009000000000000" pitchFamily="49" charset="0"/>
+              </a:rPr>
+              <a:t>foo(x=</a:t>
+            </a:r>
+            <a:r>
+              <a:rPr lang="de-DE" sz="1200" b="1">
+                <a:latin typeface="JetBrains Mono NL" panose="02000009000000000000" pitchFamily="49" charset="0"/>
+                <a:ea typeface="JetBrains Mono NL" panose="02000009000000000000" pitchFamily="49" charset="0"/>
+                <a:cs typeface="JetBrains Mono NL" panose="02000009000000000000" pitchFamily="49" charset="0"/>
+              </a:rPr>
+              <a:t>42)</a:t>
+            </a:r>
+            <a:endParaRPr lang="de-DE" sz="1200" dirty="0"/>
           </a:p>
           <a:p>
             <a:pPr marL="9524" indent="0">
@@ -13183,7 +13652,7 @@
 </p:sld>
 </file>
 
-<file path=ppt/slides/slide14.xml><?xml version="1.0" encoding="utf-8"?>
+<file path=ppt/slides/slide15.xml><?xml version="1.0" encoding="utf-8"?>
 <p:sld xmlns:a="http://schemas.openxmlformats.org/drawingml/2006/main" xmlns:r="http://schemas.openxmlformats.org/officeDocument/2006/relationships" xmlns:p="http://schemas.openxmlformats.org/presentationml/2006/main">
   <p:cSld>
     <p:spTree>
@@ -13521,7 +13990,7 @@
 </p:sld>
 </file>
 
-<file path=ppt/slides/slide15.xml><?xml version="1.0" encoding="utf-8"?>
+<file path=ppt/slides/slide16.xml><?xml version="1.0" encoding="utf-8"?>
 <p:sld xmlns:a="http://schemas.openxmlformats.org/drawingml/2006/main" xmlns:r="http://schemas.openxmlformats.org/officeDocument/2006/relationships" xmlns:p="http://schemas.openxmlformats.org/presentationml/2006/main">
   <p:cSld>
     <p:spTree>
@@ -13726,10 +14195,10 @@
       </p:grpSpPr>
       <p:sp>
         <p:nvSpPr>
-          <p:cNvPr id="5" name="Textplatzhalter 4">
-            <a:extLst>
-              <a:ext uri="{FF2B5EF4-FFF2-40B4-BE49-F238E27FC236}">
-                <a16:creationId xmlns:a16="http://schemas.microsoft.com/office/drawing/2014/main" id="{9A6BC2A2-4FD9-89F0-2F81-863D28024023}"/>
+          <p:cNvPr id="2" name="Textplatzhalter 1">
+            <a:extLst>
+              <a:ext uri="{FF2B5EF4-FFF2-40B4-BE49-F238E27FC236}">
+                <a16:creationId xmlns:a16="http://schemas.microsoft.com/office/drawing/2014/main" id="{F5FC78A4-B0BC-FA1E-F34D-4F3097871CCF}"/>
               </a:ext>
             </a:extLst>
           </p:cNvPr>
@@ -13746,108 +14215,215 @@
           <a:lstStyle/>
           <a:p>
             <a:r>
-              <a:rPr lang="de-DE" dirty="0"/>
-              <a:t>Guido van Rossum, Autor von Python</a:t>
+              <a:rPr lang="de-DE"/>
+              <a:t>Refactoring und Code-Qualität</a:t>
             </a:r>
           </a:p>
         </p:txBody>
       </p:sp>
       <p:sp>
         <p:nvSpPr>
-          <p:cNvPr id="6" name="Textplatzhalter 5">
-            <a:extLst>
-              <a:ext uri="{FF2B5EF4-FFF2-40B4-BE49-F238E27FC236}">
-                <a16:creationId xmlns:a16="http://schemas.microsoft.com/office/drawing/2014/main" id="{025F5FD6-D1EF-33DE-3260-9B12948F3210}"/>
-              </a:ext>
-            </a:extLst>
-          </p:cNvPr>
-          <p:cNvSpPr>
-            <a:spLocks noGrp="1"/>
-          </p:cNvSpPr>
-          <p:nvPr>
-            <p:ph type="body" sz="quarter" idx="11"/>
-          </p:nvPr>
+          <p:cNvPr id="3" name="Textfeld 2">
+            <a:extLst>
+              <a:ext uri="{FF2B5EF4-FFF2-40B4-BE49-F238E27FC236}">
+                <a16:creationId xmlns:a16="http://schemas.microsoft.com/office/drawing/2014/main" id="{E25D0036-6F6F-A74F-2E95-4CC65CADF0DF}"/>
+              </a:ext>
+            </a:extLst>
+          </p:cNvPr>
+          <p:cNvSpPr txBox="1"/>
+          <p:nvPr/>
         </p:nvSpPr>
-        <p:spPr/>
+        <p:spPr>
+          <a:xfrm>
+            <a:off x="823609" y="1776919"/>
+            <a:ext cx="10013004" cy="2585323"/>
+          </a:xfrm>
+          <a:prstGeom prst="rect">
+            <a:avLst/>
+          </a:prstGeom>
+          <a:noFill/>
+        </p:spPr>
         <p:txBody>
-          <a:bodyPr/>
+          <a:bodyPr wrap="square" rtlCol="0">
+            <a:spAutoFit/>
+          </a:bodyPr>
           <a:lstStyle/>
           <a:p>
             <a:r>
-              <a:rPr lang="de-DE" dirty="0"/>
-              <a:t>„Code </a:t>
-            </a:r>
-            <a:r>
-              <a:rPr lang="de-DE" dirty="0" err="1"/>
-              <a:t>is</a:t>
-            </a:r>
-            <a:r>
-              <a:rPr lang="de-DE" dirty="0"/>
+              <a:rPr lang="de-DE" b="1">
+                <a:latin typeface="Rubik" panose="02000604000000020004" pitchFamily="2" charset="-79"/>
+                <a:cs typeface="Rubik" panose="02000604000000020004" pitchFamily="2" charset="-79"/>
+              </a:rPr>
+              <a:t>Refactoring</a:t>
+            </a:r>
+            <a:r>
+              <a:rPr lang="de-DE">
+                <a:latin typeface="Rubik" panose="02000604000000020004" pitchFamily="2" charset="-79"/>
+                <a:cs typeface="Rubik" panose="02000604000000020004" pitchFamily="2" charset="-79"/>
+              </a:rPr>
+              <a:t> (auch </a:t>
+            </a:r>
+            <a:r>
+              <a:rPr lang="de-DE" b="1">
+                <a:latin typeface="Rubik" panose="02000604000000020004" pitchFamily="2" charset="-79"/>
+                <a:cs typeface="Rubik" panose="02000604000000020004" pitchFamily="2" charset="-79"/>
+              </a:rPr>
+              <a:t>Refaktorisierung</a:t>
+            </a:r>
+            <a:r>
+              <a:rPr lang="de-DE">
+                <a:latin typeface="Rubik" panose="02000604000000020004" pitchFamily="2" charset="-79"/>
+                <a:cs typeface="Rubik" panose="02000604000000020004" pitchFamily="2" charset="-79"/>
+              </a:rPr>
+              <a:t>, </a:t>
+            </a:r>
+            <a:r>
+              <a:rPr lang="de-DE" b="1">
+                <a:latin typeface="Rubik" panose="02000604000000020004" pitchFamily="2" charset="-79"/>
+                <a:cs typeface="Rubik" panose="02000604000000020004" pitchFamily="2" charset="-79"/>
+              </a:rPr>
+              <a:t>Refaktorierung</a:t>
+            </a:r>
+            <a:r>
+              <a:rPr lang="de-DE">
+                <a:latin typeface="Rubik" panose="02000604000000020004" pitchFamily="2" charset="-79"/>
+                <a:cs typeface="Rubik" panose="02000604000000020004" pitchFamily="2" charset="-79"/>
+              </a:rPr>
+              <a:t> oder </a:t>
+            </a:r>
+            <a:r>
+              <a:rPr lang="de-DE" b="1">
+                <a:latin typeface="Rubik" panose="02000604000000020004" pitchFamily="2" charset="-79"/>
+                <a:cs typeface="Rubik" panose="02000604000000020004" pitchFamily="2" charset="-79"/>
+              </a:rPr>
+              <a:t>Restrukturierung</a:t>
+            </a:r>
+            <a:r>
+              <a:rPr lang="de-DE">
+                <a:latin typeface="Rubik" panose="02000604000000020004" pitchFamily="2" charset="-79"/>
+                <a:cs typeface="Rubik" panose="02000604000000020004" pitchFamily="2" charset="-79"/>
+              </a:rPr>
+              <a:t>) bezeichnet in der </a:t>
+            </a:r>
+            <a:r>
+              <a:rPr lang="de-DE">
+                <a:latin typeface="Rubik" panose="02000604000000020004" pitchFamily="2" charset="-79"/>
+                <a:cs typeface="Rubik" panose="02000604000000020004" pitchFamily="2" charset="-79"/>
+                <a:hlinkClick r:id="rId2" tooltip="Software-Entwicklung"/>
+              </a:rPr>
+              <a:t>Software-Entwicklung</a:t>
+            </a:r>
+            <a:r>
+              <a:rPr lang="de-DE">
+                <a:latin typeface="Rubik" panose="02000604000000020004" pitchFamily="2" charset="-79"/>
+                <a:cs typeface="Rubik" panose="02000604000000020004" pitchFamily="2" charset="-79"/>
+              </a:rPr>
+              <a:t> die manuelle oder automatisierte Struktur-verbesserung von </a:t>
+            </a:r>
+            <a:r>
+              <a:rPr lang="de-DE">
+                <a:latin typeface="Rubik" panose="02000604000000020004" pitchFamily="2" charset="-79"/>
+                <a:cs typeface="Rubik" panose="02000604000000020004" pitchFamily="2" charset="-79"/>
+                <a:hlinkClick r:id="rId3" tooltip="Quelltext"/>
+              </a:rPr>
+              <a:t>Quelltexten</a:t>
+            </a:r>
+            <a:r>
+              <a:rPr lang="de-DE">
+                <a:latin typeface="Rubik" panose="02000604000000020004" pitchFamily="2" charset="-79"/>
+                <a:cs typeface="Rubik" panose="02000604000000020004" pitchFamily="2" charset="-79"/>
+              </a:rPr>
+              <a:t> unter Beibehaltung des beobachtbaren Programmverhaltens. </a:t>
+            </a:r>
+          </a:p>
+          <a:p>
+            <a:endParaRPr lang="de-DE">
+              <a:latin typeface="Rubik" panose="02000604000000020004" pitchFamily="2" charset="-79"/>
+              <a:cs typeface="Rubik" panose="02000604000000020004" pitchFamily="2" charset="-79"/>
+            </a:endParaRPr>
+          </a:p>
+          <a:p>
+            <a:r>
+              <a:rPr lang="de-DE">
+                <a:latin typeface="Rubik" panose="02000604000000020004" pitchFamily="2" charset="-79"/>
+                <a:cs typeface="Rubik" panose="02000604000000020004" pitchFamily="2" charset="-79"/>
+              </a:rPr>
+              <a:t>Dabei sollen </a:t>
+            </a:r>
+            <a:r>
+              <a:rPr lang="de-DE">
+                <a:latin typeface="Rubik" panose="02000604000000020004" pitchFamily="2" charset="-79"/>
+                <a:cs typeface="Rubik" panose="02000604000000020004" pitchFamily="2" charset="-79"/>
+                <a:hlinkClick r:id="rId4" tooltip="Lesbarkeit"/>
+              </a:rPr>
+              <a:t>Lesbarkeit</a:t>
+            </a:r>
+            <a:r>
+              <a:rPr lang="de-DE">
+                <a:latin typeface="Rubik" panose="02000604000000020004" pitchFamily="2" charset="-79"/>
+                <a:cs typeface="Rubik" panose="02000604000000020004" pitchFamily="2" charset="-79"/>
+              </a:rPr>
+              <a:t>, Verständlichkeit, </a:t>
+            </a:r>
+            <a:r>
+              <a:rPr lang="de-DE">
+                <a:latin typeface="Rubik" panose="02000604000000020004" pitchFamily="2" charset="-79"/>
+                <a:cs typeface="Rubik" panose="02000604000000020004" pitchFamily="2" charset="-79"/>
+                <a:hlinkClick r:id="rId5" tooltip="Wartbarkeit"/>
+              </a:rPr>
+              <a:t>Wartbarkeit</a:t>
+            </a:r>
+            <a:r>
+              <a:rPr lang="de-DE">
+                <a:latin typeface="Rubik" panose="02000604000000020004" pitchFamily="2" charset="-79"/>
+                <a:cs typeface="Rubik" panose="02000604000000020004" pitchFamily="2" charset="-79"/>
+              </a:rPr>
+              <a:t> und Erweiterbarkeit verbessert werden, mit dem Ziel, den jeweiligen Aufwand für </a:t>
+            </a:r>
+            <a:r>
+              <a:rPr lang="de-DE">
+                <a:latin typeface="Rubik" panose="02000604000000020004" pitchFamily="2" charset="-79"/>
+                <a:cs typeface="Rubik" panose="02000604000000020004" pitchFamily="2" charset="-79"/>
+                <a:hlinkClick r:id="rId6" tooltip="Fehler"/>
+              </a:rPr>
+              <a:t>Fehleranalyse</a:t>
+            </a:r>
+            <a:r>
+              <a:rPr lang="de-DE">
+                <a:latin typeface="Rubik" panose="02000604000000020004" pitchFamily="2" charset="-79"/>
+                <a:cs typeface="Rubik" panose="02000604000000020004" pitchFamily="2" charset="-79"/>
+              </a:rPr>
+              <a:t> und funktionale Erweiterungen deutlich zu senken.</a:t>
+            </a:r>
+          </a:p>
+          <a:p>
+            <a:endParaRPr lang="de-DE">
+              <a:latin typeface="Rubik" panose="02000604000000020004" pitchFamily="2" charset="-79"/>
+              <a:cs typeface="Rubik" panose="02000604000000020004" pitchFamily="2" charset="-79"/>
+            </a:endParaRPr>
+          </a:p>
+          <a:p>
+            <a:r>
+              <a:rPr lang="de-DE" sz="1200" i="1">
+                <a:latin typeface="Rubik" panose="02000604000000020004" pitchFamily="2" charset="-79"/>
+                <a:cs typeface="Rubik" panose="02000604000000020004" pitchFamily="2" charset="-79"/>
+              </a:rPr>
+              <a:t>Quelle: </a:t>
+            </a:r>
+            <a:r>
+              <a:rPr lang="de-DE" sz="1200" i="1">
+                <a:latin typeface="Rubik" panose="02000604000000020004" pitchFamily="2" charset="-79"/>
+                <a:cs typeface="Rubik" panose="02000604000000020004" pitchFamily="2" charset="-79"/>
+                <a:hlinkClick r:id="rId7"/>
+              </a:rPr>
+              <a:t>https://de.wikipedia.org/wiki/Refactoring</a:t>
+            </a:r>
+            <a:r>
+              <a:rPr lang="de-DE" sz="1200" i="1">
+                <a:latin typeface="Rubik" panose="02000604000000020004" pitchFamily="2" charset="-79"/>
+                <a:cs typeface="Rubik" panose="02000604000000020004" pitchFamily="2" charset="-79"/>
+              </a:rPr>
               <a:t> </a:t>
-            </a:r>
-            <a:r>
-              <a:rPr lang="de-DE" dirty="0" err="1"/>
-              <a:t>read</a:t>
-            </a:r>
-            <a:r>
-              <a:rPr lang="de-DE" dirty="0"/>
-              <a:t> </a:t>
-            </a:r>
-            <a:r>
-              <a:rPr lang="de-DE" dirty="0" err="1"/>
-              <a:t>much</a:t>
-            </a:r>
-            <a:r>
-              <a:rPr lang="de-DE" dirty="0"/>
-              <a:t> </a:t>
-            </a:r>
-            <a:r>
-              <a:rPr lang="de-DE" dirty="0" err="1"/>
-              <a:t>more</a:t>
-            </a:r>
-            <a:r>
-              <a:rPr lang="de-DE" dirty="0"/>
-              <a:t> </a:t>
-            </a:r>
-            <a:r>
-              <a:rPr lang="de-DE" dirty="0" err="1"/>
-              <a:t>often</a:t>
-            </a:r>
-            <a:r>
-              <a:rPr lang="de-DE" dirty="0"/>
-              <a:t> </a:t>
-            </a:r>
-            <a:r>
-              <a:rPr lang="de-DE" dirty="0" err="1"/>
-              <a:t>than</a:t>
-            </a:r>
-            <a:r>
-              <a:rPr lang="de-DE" dirty="0"/>
-              <a:t> </a:t>
-            </a:r>
-            <a:r>
-              <a:rPr lang="de-DE" dirty="0" err="1"/>
-              <a:t>it</a:t>
-            </a:r>
-            <a:r>
-              <a:rPr lang="de-DE" dirty="0"/>
-              <a:t> </a:t>
-            </a:r>
-            <a:r>
-              <a:rPr lang="de-DE" dirty="0" err="1"/>
-              <a:t>is</a:t>
-            </a:r>
-            <a:r>
-              <a:rPr lang="de-DE" dirty="0"/>
-              <a:t> </a:t>
-            </a:r>
-            <a:r>
-              <a:rPr lang="de-DE" dirty="0" err="1"/>
-              <a:t>written</a:t>
-            </a:r>
-            <a:r>
-              <a:rPr lang="de-DE" dirty="0"/>
-              <a:t>.“</a:t>
             </a:r>
           </a:p>
         </p:txBody>
@@ -13855,7 +14431,7 @@
     </p:spTree>
     <p:extLst>
       <p:ext uri="{BB962C8B-B14F-4D97-AF65-F5344CB8AC3E}">
-        <p14:creationId xmlns:p14="http://schemas.microsoft.com/office/powerpoint/2010/main" val="2387298241"/>
+        <p14:creationId xmlns:p14="http://schemas.microsoft.com/office/powerpoint/2010/main" val="1102308499"/>
       </p:ext>
     </p:extLst>
   </p:cSld>
@@ -13887,7 +14463,7 @@
           <p:cNvPr id="5" name="Textplatzhalter 4">
             <a:extLst>
               <a:ext uri="{FF2B5EF4-FFF2-40B4-BE49-F238E27FC236}">
-                <a16:creationId xmlns:a16="http://schemas.microsoft.com/office/drawing/2014/main" id="{DACE6AC1-2EF0-31B3-12EB-6B0EC3F9CD10}"/>
+                <a16:creationId xmlns:a16="http://schemas.microsoft.com/office/drawing/2014/main" id="{9A6BC2A2-4FD9-89F0-2F81-863D28024023}"/>
               </a:ext>
             </a:extLst>
           </p:cNvPr>
@@ -13904,16 +14480,9 @@
           <a:lstStyle/>
           <a:p>
             <a:r>
-              <a:rPr lang="de-DE" dirty="0" err="1"/>
-              <a:t>Refactoring</a:t>
-            </a:r>
-            <a:r>
               <a:rPr lang="de-DE" dirty="0"/>
-              <a:t> und Code-Qualität</a:t>
-            </a:r>
-          </a:p>
-          <a:p>
-            <a:endParaRPr lang="de-DE" dirty="0"/>
+              <a:t>Guido van Rossum, Autor von Python</a:t>
+            </a:r>
           </a:p>
         </p:txBody>
       </p:sp>
@@ -13922,7 +14491,7 @@
           <p:cNvPr id="6" name="Textplatzhalter 5">
             <a:extLst>
               <a:ext uri="{FF2B5EF4-FFF2-40B4-BE49-F238E27FC236}">
-                <a16:creationId xmlns:a16="http://schemas.microsoft.com/office/drawing/2014/main" id="{AAB2B4B8-FFC3-5404-C56B-F73B90F1BE38}"/>
+                <a16:creationId xmlns:a16="http://schemas.microsoft.com/office/drawing/2014/main" id="{025F5FD6-D1EF-33DE-3260-9B12948F3210}"/>
               </a:ext>
             </a:extLst>
           </p:cNvPr>
@@ -13939,100 +14508,88 @@
           <a:lstStyle/>
           <a:p>
             <a:r>
-              <a:rPr lang="de-DE" b="1" dirty="0"/>
-              <a:t>Was bringt sauberer Code?</a:t>
-            </a:r>
-          </a:p>
-        </p:txBody>
-      </p:sp>
-      <p:sp>
-        <p:nvSpPr>
-          <p:cNvPr id="2" name="Inhaltsplatzhalter 1">
-            <a:extLst>
-              <a:ext uri="{FF2B5EF4-FFF2-40B4-BE49-F238E27FC236}">
-                <a16:creationId xmlns:a16="http://schemas.microsoft.com/office/drawing/2014/main" id="{37ED26B6-D871-D504-2D95-1B0EEDA7B7EA}"/>
-              </a:ext>
-            </a:extLst>
-          </p:cNvPr>
-          <p:cNvSpPr>
-            <a:spLocks noGrp="1"/>
-          </p:cNvSpPr>
-          <p:nvPr>
-            <p:ph sz="quarter" idx="12"/>
-          </p:nvPr>
-        </p:nvSpPr>
-        <p:spPr>
-          <a:xfrm>
-            <a:off x="1563667" y="1566478"/>
-            <a:ext cx="9064665" cy="3972701"/>
-          </a:xfrm>
-        </p:spPr>
-        <p:txBody>
-          <a:bodyPr/>
-          <a:lstStyle/>
-          <a:p>
-            <a:r>
-              <a:rPr lang="de-DE" b="1" dirty="0"/>
-              <a:t>Fehler lassen sich schneller finden und beheben</a:t>
-            </a:r>
-          </a:p>
-          <a:p>
-            <a:r>
-              <a:rPr lang="de-DE" b="1" dirty="0"/>
-              <a:t>Bessere Zusammenarbeit im Team:</a:t>
-            </a:r>
-            <a:br>
               <a:rPr lang="de-DE" dirty="0"/>
-            </a:br>
+              <a:t>„Code </a:t>
+            </a:r>
+            <a:r>
+              <a:rPr lang="de-DE" dirty="0" err="1"/>
+              <a:t>is</a:t>
+            </a:r>
             <a:r>
               <a:rPr lang="de-DE" dirty="0"/>
-              <a:t>Einheitliche und lesbare Struktur erspart allen Zeit, besonders wenn mehrere an einem Projekt arbeiten.</a:t>
-            </a:r>
-          </a:p>
-          <a:p>
-            <a:r>
-              <a:rPr lang="de-DE" b="1" dirty="0"/>
-              <a:t>Einfachere Wartung und Erweiterung:</a:t>
-            </a:r>
-            <a:br>
+              <a:t> </a:t>
+            </a:r>
+            <a:r>
+              <a:rPr lang="de-DE" dirty="0" err="1"/>
+              <a:t>read</a:t>
+            </a:r>
+            <a:r>
               <a:rPr lang="de-DE" dirty="0"/>
-            </a:br>
+              <a:t> </a:t>
+            </a:r>
+            <a:r>
+              <a:rPr lang="de-DE" dirty="0" err="1"/>
+              <a:t>much</a:t>
+            </a:r>
             <a:r>
               <a:rPr lang="de-DE" dirty="0"/>
-              <a:t>Kann später leichter neue Funktionen einbauen, ohne gleich alles neu machen zu müssen.</a:t>
-            </a:r>
-          </a:p>
-          <a:p>
-            <a:r>
-              <a:rPr lang="de-DE" b="1" dirty="0"/>
-              <a:t>Du sparst deinem zukünftigen Ich viel Arbeit:</a:t>
-            </a:r>
-            <a:br>
+              <a:t> </a:t>
+            </a:r>
+            <a:r>
+              <a:rPr lang="de-DE" dirty="0" err="1"/>
+              <a:t>more</a:t>
+            </a:r>
+            <a:r>
               <a:rPr lang="de-DE" dirty="0"/>
-            </a:br>
+              <a:t> </a:t>
+            </a:r>
+            <a:r>
+              <a:rPr lang="de-DE" dirty="0" err="1"/>
+              <a:t>often</a:t>
+            </a:r>
             <a:r>
               <a:rPr lang="de-DE" dirty="0"/>
-              <a:t>Spätestens beim nächsten Update ist jeder dankbar, wenn der Code nach ein paar Wochen noch verständlich ist.</a:t>
-            </a:r>
-          </a:p>
-          <a:p>
-            <a:pPr marL="9524" indent="0">
-              <a:buNone/>
-            </a:pPr>
-            <a:endParaRPr lang="de-DE" dirty="0"/>
-          </a:p>
-          <a:p>
-            <a:pPr marL="9524" indent="0">
-              <a:buNone/>
-            </a:pPr>
-            <a:endParaRPr lang="de-DE" dirty="0"/>
+              <a:t> </a:t>
+            </a:r>
+            <a:r>
+              <a:rPr lang="de-DE" dirty="0" err="1"/>
+              <a:t>than</a:t>
+            </a:r>
+            <a:r>
+              <a:rPr lang="de-DE" dirty="0"/>
+              <a:t> </a:t>
+            </a:r>
+            <a:r>
+              <a:rPr lang="de-DE" dirty="0" err="1"/>
+              <a:t>it</a:t>
+            </a:r>
+            <a:r>
+              <a:rPr lang="de-DE" dirty="0"/>
+              <a:t> </a:t>
+            </a:r>
+            <a:r>
+              <a:rPr lang="de-DE" dirty="0" err="1"/>
+              <a:t>is</a:t>
+            </a:r>
+            <a:r>
+              <a:rPr lang="de-DE" dirty="0"/>
+              <a:t> </a:t>
+            </a:r>
+            <a:r>
+              <a:rPr lang="de-DE" dirty="0" err="1"/>
+              <a:t>written</a:t>
+            </a:r>
+            <a:r>
+              <a:rPr lang="de-DE" dirty="0"/>
+              <a:t>.“</a:t>
+            </a:r>
           </a:p>
         </p:txBody>
       </p:sp>
     </p:spTree>
     <p:extLst>
       <p:ext uri="{BB962C8B-B14F-4D97-AF65-F5344CB8AC3E}">
-        <p14:creationId xmlns:p14="http://schemas.microsoft.com/office/powerpoint/2010/main" val="3916163411"/>
+        <p14:creationId xmlns:p14="http://schemas.microsoft.com/office/powerpoint/2010/main" val="2387298241"/>
       </p:ext>
     </p:extLst>
   </p:cSld>
@@ -14061,6 +14618,183 @@
       </p:grpSpPr>
       <p:sp>
         <p:nvSpPr>
+          <p:cNvPr id="5" name="Textplatzhalter 4">
+            <a:extLst>
+              <a:ext uri="{FF2B5EF4-FFF2-40B4-BE49-F238E27FC236}">
+                <a16:creationId xmlns:a16="http://schemas.microsoft.com/office/drawing/2014/main" id="{DACE6AC1-2EF0-31B3-12EB-6B0EC3F9CD10}"/>
+              </a:ext>
+            </a:extLst>
+          </p:cNvPr>
+          <p:cNvSpPr>
+            <a:spLocks noGrp="1"/>
+          </p:cNvSpPr>
+          <p:nvPr>
+            <p:ph type="body" sz="quarter" idx="10"/>
+          </p:nvPr>
+        </p:nvSpPr>
+        <p:spPr/>
+        <p:txBody>
+          <a:bodyPr/>
+          <a:lstStyle/>
+          <a:p>
+            <a:r>
+              <a:rPr lang="de-DE" dirty="0" err="1"/>
+              <a:t>Refactoring</a:t>
+            </a:r>
+            <a:r>
+              <a:rPr lang="de-DE" dirty="0"/>
+              <a:t> und Code-Qualität</a:t>
+            </a:r>
+          </a:p>
+          <a:p>
+            <a:endParaRPr lang="de-DE" dirty="0"/>
+          </a:p>
+        </p:txBody>
+      </p:sp>
+      <p:sp>
+        <p:nvSpPr>
+          <p:cNvPr id="6" name="Textplatzhalter 5">
+            <a:extLst>
+              <a:ext uri="{FF2B5EF4-FFF2-40B4-BE49-F238E27FC236}">
+                <a16:creationId xmlns:a16="http://schemas.microsoft.com/office/drawing/2014/main" id="{AAB2B4B8-FFC3-5404-C56B-F73B90F1BE38}"/>
+              </a:ext>
+            </a:extLst>
+          </p:cNvPr>
+          <p:cNvSpPr>
+            <a:spLocks noGrp="1"/>
+          </p:cNvSpPr>
+          <p:nvPr>
+            <p:ph type="body" sz="quarter" idx="11"/>
+          </p:nvPr>
+        </p:nvSpPr>
+        <p:spPr/>
+        <p:txBody>
+          <a:bodyPr/>
+          <a:lstStyle/>
+          <a:p>
+            <a:r>
+              <a:rPr lang="de-DE" b="1" dirty="0"/>
+              <a:t>Was bringt sauberer Code?</a:t>
+            </a:r>
+          </a:p>
+        </p:txBody>
+      </p:sp>
+      <p:sp>
+        <p:nvSpPr>
+          <p:cNvPr id="2" name="Inhaltsplatzhalter 1">
+            <a:extLst>
+              <a:ext uri="{FF2B5EF4-FFF2-40B4-BE49-F238E27FC236}">
+                <a16:creationId xmlns:a16="http://schemas.microsoft.com/office/drawing/2014/main" id="{37ED26B6-D871-D504-2D95-1B0EEDA7B7EA}"/>
+              </a:ext>
+            </a:extLst>
+          </p:cNvPr>
+          <p:cNvSpPr>
+            <a:spLocks noGrp="1"/>
+          </p:cNvSpPr>
+          <p:nvPr>
+            <p:ph sz="quarter" idx="12"/>
+          </p:nvPr>
+        </p:nvSpPr>
+        <p:spPr>
+          <a:xfrm>
+            <a:off x="1563667" y="1566478"/>
+            <a:ext cx="9064665" cy="3972701"/>
+          </a:xfrm>
+        </p:spPr>
+        <p:txBody>
+          <a:bodyPr/>
+          <a:lstStyle/>
+          <a:p>
+            <a:r>
+              <a:rPr lang="de-DE" b="1" dirty="0"/>
+              <a:t>Fehler lassen sich schneller finden und beheben</a:t>
+            </a:r>
+          </a:p>
+          <a:p>
+            <a:r>
+              <a:rPr lang="de-DE" b="1" dirty="0"/>
+              <a:t>Bessere Zusammenarbeit im Team:</a:t>
+            </a:r>
+            <a:br>
+              <a:rPr lang="de-DE" dirty="0"/>
+            </a:br>
+            <a:r>
+              <a:rPr lang="de-DE" dirty="0"/>
+              <a:t>Einheitliche und lesbare Struktur erspart allen Zeit, besonders wenn mehrere an einem Projekt arbeiten.</a:t>
+            </a:r>
+          </a:p>
+          <a:p>
+            <a:r>
+              <a:rPr lang="de-DE" b="1" dirty="0"/>
+              <a:t>Einfachere Wartung und Erweiterung:</a:t>
+            </a:r>
+            <a:br>
+              <a:rPr lang="de-DE" dirty="0"/>
+            </a:br>
+            <a:r>
+              <a:rPr lang="de-DE" dirty="0"/>
+              <a:t>Kann später leichter neue Funktionen einbauen, ohne gleich alles neu machen zu müssen.</a:t>
+            </a:r>
+          </a:p>
+          <a:p>
+            <a:r>
+              <a:rPr lang="de-DE" b="1" dirty="0"/>
+              <a:t>Du sparst deinem zukünftigen Ich viel Arbeit:</a:t>
+            </a:r>
+            <a:br>
+              <a:rPr lang="de-DE" dirty="0"/>
+            </a:br>
+            <a:r>
+              <a:rPr lang="de-DE" dirty="0"/>
+              <a:t>Spätestens beim nächsten Update ist jeder dankbar, wenn der Code nach ein paar Wochen noch verständlich ist.</a:t>
+            </a:r>
+          </a:p>
+          <a:p>
+            <a:pPr marL="9524" indent="0">
+              <a:buNone/>
+            </a:pPr>
+            <a:endParaRPr lang="de-DE" dirty="0"/>
+          </a:p>
+          <a:p>
+            <a:pPr marL="9524" indent="0">
+              <a:buNone/>
+            </a:pPr>
+            <a:endParaRPr lang="de-DE" dirty="0"/>
+          </a:p>
+        </p:txBody>
+      </p:sp>
+    </p:spTree>
+    <p:extLst>
+      <p:ext uri="{BB962C8B-B14F-4D97-AF65-F5344CB8AC3E}">
+        <p14:creationId xmlns:p14="http://schemas.microsoft.com/office/powerpoint/2010/main" val="3916163411"/>
+      </p:ext>
+    </p:extLst>
+  </p:cSld>
+  <p:clrMapOvr>
+    <a:masterClrMapping/>
+  </p:clrMapOvr>
+</p:sld>
+</file>
+
+<file path=ppt/slides/slide5.xml><?xml version="1.0" encoding="utf-8"?>
+<p:sld xmlns:a="http://schemas.openxmlformats.org/drawingml/2006/main" xmlns:r="http://schemas.openxmlformats.org/officeDocument/2006/relationships" xmlns:p="http://schemas.openxmlformats.org/presentationml/2006/main">
+  <p:cSld>
+    <p:spTree>
+      <p:nvGrpSpPr>
+        <p:cNvPr id="1" name=""/>
+        <p:cNvGrpSpPr/>
+        <p:nvPr/>
+      </p:nvGrpSpPr>
+      <p:grpSpPr>
+        <a:xfrm>
+          <a:off x="0" y="0"/>
+          <a:ext cx="0" cy="0"/>
+          <a:chOff x="0" y="0"/>
+          <a:chExt cx="0" cy="0"/>
+        </a:xfrm>
+      </p:grpSpPr>
+      <p:sp>
+        <p:nvSpPr>
           <p:cNvPr id="4" name="Textplatzhalter 3">
             <a:extLst>
               <a:ext uri="{FF2B5EF4-FFF2-40B4-BE49-F238E27FC236}">
@@ -14327,7 +15061,7 @@
 </p:sld>
 </file>
 
-<file path=ppt/slides/slide5.xml><?xml version="1.0" encoding="utf-8"?>
+<file path=ppt/slides/slide6.xml><?xml version="1.0" encoding="utf-8"?>
 <p:sld xmlns:a="http://schemas.openxmlformats.org/drawingml/2006/main" xmlns:r="http://schemas.openxmlformats.org/officeDocument/2006/relationships" xmlns:p="http://schemas.openxmlformats.org/presentationml/2006/main">
   <p:cSld>
     <p:spTree>
@@ -14478,46 +15212,71 @@
             <a:pPr lvl="1"/>
             <a:r>
               <a:rPr lang="de-DE" sz="1800" dirty="0"/>
-              <a:t>Wiederholter Code (Code </a:t>
-            </a:r>
-            <a:r>
-              <a:rPr lang="de-DE" sz="1800" dirty="0" err="1"/>
+              <a:t>Wiederholter </a:t>
+            </a:r>
+            <a:r>
+              <a:rPr lang="de-DE" sz="1800"/>
+              <a:t>Code (</a:t>
+            </a:r>
+            <a:r>
+              <a:rPr lang="de-DE" sz="1800" i="1"/>
+              <a:t>„Code </a:t>
+            </a:r>
+            <a:r>
+              <a:rPr lang="de-DE" sz="1800" i="1" dirty="0" err="1"/>
               <a:t>Duplication</a:t>
             </a:r>
             <a:r>
+              <a:rPr lang="de-DE" sz="1800" i="1" dirty="0"/>
+              <a:t>“</a:t>
+            </a:r>
+            <a:r>
               <a:rPr lang="de-DE" sz="1800" dirty="0"/>
-              <a:t>“)</a:t>
+              <a:t>)</a:t>
             </a:r>
           </a:p>
           <a:p>
             <a:pPr lvl="1"/>
             <a:r>
               <a:rPr lang="de-DE" sz="1800" dirty="0"/>
-              <a:t>Lange, komplexe Funktionen („</a:t>
-            </a:r>
-            <a:r>
-              <a:rPr lang="de-DE" sz="1800" dirty="0" err="1"/>
+              <a:t>Lange, komplexe Funktionen (</a:t>
+            </a:r>
+            <a:r>
+              <a:rPr lang="de-DE" sz="1800" i="1" dirty="0"/>
+              <a:t>„</a:t>
+            </a:r>
+            <a:r>
+              <a:rPr lang="de-DE" sz="1800" i="1" dirty="0" err="1"/>
               <a:t>God</a:t>
             </a:r>
             <a:r>
+              <a:rPr lang="de-DE" sz="1800" i="1" dirty="0"/>
+              <a:t> </a:t>
+            </a:r>
+            <a:r>
+              <a:rPr lang="de-DE" sz="1800" i="1" dirty="0" err="1"/>
+              <a:t>Function</a:t>
+            </a:r>
+            <a:r>
+              <a:rPr lang="de-DE" sz="1800" i="1" dirty="0"/>
+              <a:t>“</a:t>
+            </a:r>
+            <a:r>
               <a:rPr lang="de-DE" sz="1800" dirty="0"/>
-              <a:t> </a:t>
-            </a:r>
-            <a:r>
-              <a:rPr lang="de-DE" sz="1800" dirty="0" err="1"/>
-              <a:t>Function</a:t>
-            </a:r>
+              <a:t>)</a:t>
+            </a:r>
+          </a:p>
+          <a:p>
+            <a:pPr lvl="1"/>
             <a:r>
               <a:rPr lang="de-DE" sz="1800" dirty="0"/>
-              <a:t>“)</a:t>
-            </a:r>
-          </a:p>
-          <a:p>
-            <a:pPr lvl="1"/>
-            <a:r>
-              <a:rPr lang="de-DE" sz="1800" dirty="0"/>
-              <a:t>Unklare oder kryptische Namen</a:t>
-            </a:r>
+              <a:t>Unklare oder </a:t>
+            </a:r>
+            <a:r>
+              <a:rPr lang="de-DE" sz="1800"/>
+              <a:t>kryptische Namen</a:t>
+            </a:r>
+            <a:endParaRPr lang="de-DE" sz="1800" dirty="0"/>
           </a:p>
           <a:p>
             <a:pPr lvl="1"/>
@@ -14536,7 +15295,11 @@
           <a:p>
             <a:r>
               <a:rPr lang="de-DE" sz="2000" dirty="0"/>
-              <a:t>Keine objektiven Kriterien: Jedes Projekt hat seine Anforderungen</a:t>
+              <a:t>Keine objektiven Kriterien: Jedes Projekt hat </a:t>
+            </a:r>
+            <a:r>
+              <a:rPr lang="de-DE" sz="2000"/>
+              <a:t>seine eigenen Anforderungen</a:t>
             </a:r>
             <a:endParaRPr lang="de-DE" sz="2200" dirty="0"/>
           </a:p>
@@ -14644,7 +15407,7 @@
 </p:sld>
 </file>
 
-<file path=ppt/slides/slide6.xml><?xml version="1.0" encoding="utf-8"?>
+<file path=ppt/slides/slide7.xml><?xml version="1.0" encoding="utf-8"?>
 <p:sld xmlns:a="http://schemas.openxmlformats.org/drawingml/2006/main" xmlns:r="http://schemas.openxmlformats.org/officeDocument/2006/relationships" xmlns:p="http://schemas.openxmlformats.org/presentationml/2006/main">
   <p:cSld>
     <p:spTree>
@@ -14982,7 +15745,7 @@
 </p:sld>
 </file>
 
-<file path=ppt/slides/slide7.xml><?xml version="1.0" encoding="utf-8"?>
+<file path=ppt/slides/slide8.xml><?xml version="1.0" encoding="utf-8"?>
 <p:sld xmlns:a="http://schemas.openxmlformats.org/drawingml/2006/main" xmlns:r="http://schemas.openxmlformats.org/officeDocument/2006/relationships" xmlns:p="http://schemas.openxmlformats.org/presentationml/2006/main">
   <p:cSld>
     <p:spTree>
@@ -15321,7 +16084,7 @@
 </p:sld>
 </file>
 
-<file path=ppt/slides/slide8.xml><?xml version="1.0" encoding="utf-8"?>
+<file path=ppt/slides/slide9.xml><?xml version="1.0" encoding="utf-8"?>
 <p:sld xmlns:a="http://schemas.openxmlformats.org/drawingml/2006/main" xmlns:r="http://schemas.openxmlformats.org/officeDocument/2006/relationships" xmlns:p="http://schemas.openxmlformats.org/presentationml/2006/main">
   <p:cSld>
     <p:spTree>
@@ -15656,343 +16419,6 @@
     <p:extLst>
       <p:ext uri="{BB962C8B-B14F-4D97-AF65-F5344CB8AC3E}">
         <p14:creationId xmlns:p14="http://schemas.microsoft.com/office/powerpoint/2010/main" val="1733995687"/>
-      </p:ext>
-    </p:extLst>
-  </p:cSld>
-  <p:clrMapOvr>
-    <a:masterClrMapping/>
-  </p:clrMapOvr>
-</p:sld>
-</file>
-
-<file path=ppt/slides/slide9.xml><?xml version="1.0" encoding="utf-8"?>
-<p:sld xmlns:a="http://schemas.openxmlformats.org/drawingml/2006/main" xmlns:r="http://schemas.openxmlformats.org/officeDocument/2006/relationships" xmlns:p="http://schemas.openxmlformats.org/presentationml/2006/main">
-  <p:cSld>
-    <p:spTree>
-      <p:nvGrpSpPr>
-        <p:cNvPr id="1" name="">
-          <a:extLst>
-            <a:ext uri="{FF2B5EF4-FFF2-40B4-BE49-F238E27FC236}">
-              <a16:creationId xmlns:a16="http://schemas.microsoft.com/office/drawing/2014/main" id="{B4A6AF4C-C36B-B621-FA6A-144E19E6CF13}"/>
-            </a:ext>
-          </a:extLst>
-        </p:cNvPr>
-        <p:cNvGrpSpPr/>
-        <p:nvPr/>
-      </p:nvGrpSpPr>
-      <p:grpSpPr>
-        <a:xfrm>
-          <a:off x="0" y="0"/>
-          <a:ext cx="0" cy="0"/>
-          <a:chOff x="0" y="0"/>
-          <a:chExt cx="0" cy="0"/>
-        </a:xfrm>
-      </p:grpSpPr>
-      <p:sp>
-        <p:nvSpPr>
-          <p:cNvPr id="4" name="Textplatzhalter 3">
-            <a:extLst>
-              <a:ext uri="{FF2B5EF4-FFF2-40B4-BE49-F238E27FC236}">
-                <a16:creationId xmlns:a16="http://schemas.microsoft.com/office/drawing/2014/main" id="{203940B6-F0B4-FB4C-CAA3-09510C9688F8}"/>
-              </a:ext>
-            </a:extLst>
-          </p:cNvPr>
-          <p:cNvSpPr>
-            <a:spLocks noGrp="1"/>
-          </p:cNvSpPr>
-          <p:nvPr>
-            <p:ph type="body" sz="quarter" idx="10"/>
-          </p:nvPr>
-        </p:nvSpPr>
-        <p:spPr/>
-        <p:txBody>
-          <a:bodyPr/>
-          <a:lstStyle/>
-          <a:p>
-            <a:r>
-              <a:rPr lang="de-DE" dirty="0" err="1"/>
-              <a:t>Refactoring</a:t>
-            </a:r>
-            <a:r>
-              <a:rPr lang="de-DE" dirty="0"/>
-              <a:t> und Code-Qualität</a:t>
-            </a:r>
-          </a:p>
-          <a:p>
-            <a:endParaRPr lang="de-DE" dirty="0"/>
-          </a:p>
-        </p:txBody>
-      </p:sp>
-      <p:sp>
-        <p:nvSpPr>
-          <p:cNvPr id="5" name="Textplatzhalter 4">
-            <a:extLst>
-              <a:ext uri="{FF2B5EF4-FFF2-40B4-BE49-F238E27FC236}">
-                <a16:creationId xmlns:a16="http://schemas.microsoft.com/office/drawing/2014/main" id="{ACA06F4A-ABAD-E33A-BBFA-F39989207C81}"/>
-              </a:ext>
-            </a:extLst>
-          </p:cNvPr>
-          <p:cNvSpPr>
-            <a:spLocks noGrp="1"/>
-          </p:cNvSpPr>
-          <p:nvPr>
-            <p:ph type="body" sz="quarter" idx="11"/>
-          </p:nvPr>
-        </p:nvSpPr>
-        <p:spPr/>
-        <p:txBody>
-          <a:bodyPr/>
-          <a:lstStyle/>
-          <a:p>
-            <a:r>
-              <a:rPr lang="de-DE" sz="3200" b="1" dirty="0"/>
-              <a:t>Tipp 4: Komplexe Bedingungen vereinfachen</a:t>
-            </a:r>
-          </a:p>
-        </p:txBody>
-      </p:sp>
-      <p:sp>
-        <p:nvSpPr>
-          <p:cNvPr id="7" name="Rectangle: Rounded Corners 1">
-            <a:extLst>
-              <a:ext uri="{FF2B5EF4-FFF2-40B4-BE49-F238E27FC236}">
-                <a16:creationId xmlns:a16="http://schemas.microsoft.com/office/drawing/2014/main" id="{CC65B875-CFA7-E787-9228-CD0639641CE2}"/>
-              </a:ext>
-            </a:extLst>
-          </p:cNvPr>
-          <p:cNvSpPr/>
-          <p:nvPr/>
-        </p:nvSpPr>
-        <p:spPr>
-          <a:xfrm>
-            <a:off x="2349280" y="1504921"/>
-            <a:ext cx="1677406" cy="510254"/>
-          </a:xfrm>
-          <a:prstGeom prst="roundRect">
-            <a:avLst/>
-          </a:prstGeom>
-          <a:solidFill>
-            <a:srgbClr val="5500EB"/>
-          </a:solidFill>
-          <a:ln w="25400" cap="flat" cmpd="sng" algn="ctr">
-            <a:noFill/>
-            <a:prstDash val="solid"/>
-            <a:miter lim="800000"/>
-          </a:ln>
-          <a:effectLst>
-            <a:outerShdw dist="88900" dir="2700000" algn="tl" rotWithShape="0">
-              <a:srgbClr val="140046"/>
-            </a:outerShdw>
-          </a:effectLst>
-        </p:spPr>
-        <p:txBody>
-          <a:bodyPr lIns="288000" tIns="108000" rIns="288000" bIns="180000" rtlCol="0" anchor="ctr" anchorCtr="0"/>
-          <a:lstStyle/>
-          <a:p>
-            <a:pPr marL="0" marR="0" lvl="0" indent="0" algn="ctr" defTabSz="914400" eaLnBrk="1" fontAlgn="auto" latinLnBrk="0" hangingPunct="1">
-              <a:lnSpc>
-                <a:spcPct val="100000"/>
-              </a:lnSpc>
-              <a:spcBef>
-                <a:spcPts val="0"/>
-              </a:spcBef>
-              <a:spcAft>
-                <a:spcPts val="0"/>
-              </a:spcAft>
-              <a:buClrTx/>
-              <a:buSzTx/>
-              <a:buFontTx/>
-              <a:buNone/>
-              <a:tabLst/>
-              <a:defRPr/>
-            </a:pPr>
-            <a:r>
-              <a:rPr kumimoji="0" lang="de-DE" sz="2000" b="1" i="0" u="none" strike="noStrike" kern="0" cap="none" spc="0" normalizeH="0" baseline="0" noProof="0" dirty="0">
-                <a:ln>
-                  <a:noFill/>
-                </a:ln>
-                <a:solidFill>
-                  <a:srgbClr val="FFFFFF"/>
-                </a:solidFill>
-                <a:effectLst/>
-                <a:uLnTx/>
-                <a:uFillTx/>
-                <a:latin typeface="Rubik SemiBold" pitchFamily="2" charset="-79"/>
-                <a:ea typeface="+mn-ea"/>
-                <a:cs typeface="Rubik SemiBold" pitchFamily="2" charset="-79"/>
-              </a:rPr>
-              <a:t>Vorher</a:t>
-            </a:r>
-            <a:endParaRPr kumimoji="0" lang="en-US" sz="2000" b="0" i="0" u="none" strike="noStrike" kern="0" cap="none" spc="0" normalizeH="0" baseline="0" noProof="0" dirty="0">
-              <a:ln>
-                <a:noFill/>
-              </a:ln>
-              <a:solidFill>
-                <a:srgbClr val="000000"/>
-              </a:solidFill>
-              <a:effectLst/>
-              <a:uLnTx/>
-              <a:uFillTx/>
-              <a:latin typeface="Source Sans Pro Light" panose="020B0403030403020204" pitchFamily="34" charset="0"/>
-              <a:ea typeface="Source Sans Pro Light" panose="020B0403030403020204" pitchFamily="34" charset="0"/>
-              <a:cs typeface="Poppins" pitchFamily="2" charset="77"/>
-            </a:endParaRPr>
-          </a:p>
-        </p:txBody>
-      </p:sp>
-      <p:sp>
-        <p:nvSpPr>
-          <p:cNvPr id="9" name="Rectangle: Rounded Corners 1">
-            <a:extLst>
-              <a:ext uri="{FF2B5EF4-FFF2-40B4-BE49-F238E27FC236}">
-                <a16:creationId xmlns:a16="http://schemas.microsoft.com/office/drawing/2014/main" id="{0227D314-F3ED-DFA6-41B0-CB776E098F5C}"/>
-              </a:ext>
-            </a:extLst>
-          </p:cNvPr>
-          <p:cNvSpPr/>
-          <p:nvPr/>
-        </p:nvSpPr>
-        <p:spPr>
-          <a:xfrm>
-            <a:off x="8485864" y="1488114"/>
-            <a:ext cx="1677406" cy="543869"/>
-          </a:xfrm>
-          <a:prstGeom prst="roundRect">
-            <a:avLst/>
-          </a:prstGeom>
-          <a:solidFill>
-            <a:srgbClr val="5500EB"/>
-          </a:solidFill>
-          <a:ln w="25400" cap="flat" cmpd="sng" algn="ctr">
-            <a:noFill/>
-            <a:prstDash val="solid"/>
-            <a:miter lim="800000"/>
-          </a:ln>
-          <a:effectLst>
-            <a:outerShdw dist="88900" dir="2700000" algn="tl" rotWithShape="0">
-              <a:srgbClr val="140046"/>
-            </a:outerShdw>
-          </a:effectLst>
-        </p:spPr>
-        <p:txBody>
-          <a:bodyPr lIns="288000" tIns="108000" rIns="288000" bIns="180000" rtlCol="0" anchor="ctr" anchorCtr="0"/>
-          <a:lstStyle/>
-          <a:p>
-            <a:pPr marL="0" marR="0" lvl="0" indent="0" algn="ctr" defTabSz="914400" eaLnBrk="1" fontAlgn="auto" latinLnBrk="0" hangingPunct="1">
-              <a:lnSpc>
-                <a:spcPct val="100000"/>
-              </a:lnSpc>
-              <a:spcBef>
-                <a:spcPts val="0"/>
-              </a:spcBef>
-              <a:spcAft>
-                <a:spcPts val="0"/>
-              </a:spcAft>
-              <a:buClrTx/>
-              <a:buSzTx/>
-              <a:buFontTx/>
-              <a:buNone/>
-              <a:tabLst/>
-              <a:defRPr/>
-            </a:pPr>
-            <a:r>
-              <a:rPr kumimoji="0" lang="de-DE" sz="2000" b="1" i="0" u="none" strike="noStrike" kern="0" cap="none" spc="0" normalizeH="0" baseline="0" noProof="0" dirty="0">
-                <a:ln>
-                  <a:noFill/>
-                </a:ln>
-                <a:solidFill>
-                  <a:srgbClr val="FFFFFF"/>
-                </a:solidFill>
-                <a:effectLst/>
-                <a:uLnTx/>
-                <a:uFillTx/>
-                <a:latin typeface="Rubik SemiBold" pitchFamily="2" charset="-79"/>
-                <a:ea typeface="+mn-ea"/>
-                <a:cs typeface="Rubik SemiBold" pitchFamily="2" charset="-79"/>
-              </a:rPr>
-              <a:t>Nachher</a:t>
-            </a:r>
-            <a:endParaRPr kumimoji="0" lang="en-US" sz="2000" b="0" i="0" u="none" strike="noStrike" kern="0" cap="none" spc="0" normalizeH="0" baseline="0" noProof="0" dirty="0">
-              <a:ln>
-                <a:noFill/>
-              </a:ln>
-              <a:solidFill>
-                <a:srgbClr val="000000"/>
-              </a:solidFill>
-              <a:effectLst/>
-              <a:uLnTx/>
-              <a:uFillTx/>
-              <a:latin typeface="Source Sans Pro Light" panose="020B0403030403020204" pitchFamily="34" charset="0"/>
-              <a:ea typeface="Source Sans Pro Light" panose="020B0403030403020204" pitchFamily="34" charset="0"/>
-              <a:cs typeface="Poppins" pitchFamily="2" charset="77"/>
-            </a:endParaRPr>
-          </a:p>
-        </p:txBody>
-      </p:sp>
-      <p:pic>
-        <p:nvPicPr>
-          <p:cNvPr id="6" name="Grafik 5">
-            <a:extLst>
-              <a:ext uri="{FF2B5EF4-FFF2-40B4-BE49-F238E27FC236}">
-                <a16:creationId xmlns:a16="http://schemas.microsoft.com/office/drawing/2014/main" id="{42064E9D-E1D3-1282-2D03-7D0EAFB1B354}"/>
-              </a:ext>
-            </a:extLst>
-          </p:cNvPr>
-          <p:cNvPicPr>
-            <a:picLocks noChangeAspect="1"/>
-          </p:cNvPicPr>
-          <p:nvPr/>
-        </p:nvPicPr>
-        <p:blipFill>
-          <a:blip r:embed="rId2"/>
-          <a:stretch>
-            <a:fillRect/>
-          </a:stretch>
-        </p:blipFill>
-        <p:spPr>
-          <a:xfrm>
-            <a:off x="406295" y="2031983"/>
-            <a:ext cx="5563376" cy="1467055"/>
-          </a:xfrm>
-          <a:prstGeom prst="rect">
-            <a:avLst/>
-          </a:prstGeom>
-        </p:spPr>
-      </p:pic>
-      <p:pic>
-        <p:nvPicPr>
-          <p:cNvPr id="11" name="Grafik 10">
-            <a:extLst>
-              <a:ext uri="{FF2B5EF4-FFF2-40B4-BE49-F238E27FC236}">
-                <a16:creationId xmlns:a16="http://schemas.microsoft.com/office/drawing/2014/main" id="{A1C1A260-0AEA-877D-EB37-B3568D2949F9}"/>
-              </a:ext>
-            </a:extLst>
-          </p:cNvPr>
-          <p:cNvPicPr>
-            <a:picLocks noChangeAspect="1"/>
-          </p:cNvPicPr>
-          <p:nvPr/>
-        </p:nvPicPr>
-        <p:blipFill>
-          <a:blip r:embed="rId3"/>
-          <a:stretch>
-            <a:fillRect/>
-          </a:stretch>
-        </p:blipFill>
-        <p:spPr>
-          <a:xfrm>
-            <a:off x="6569884" y="2015175"/>
-            <a:ext cx="5306165" cy="1781424"/>
-          </a:xfrm>
-          <a:prstGeom prst="rect">
-            <a:avLst/>
-          </a:prstGeom>
-        </p:spPr>
-      </p:pic>
-    </p:spTree>
-    <p:extLst>
-      <p:ext uri="{BB962C8B-B14F-4D97-AF65-F5344CB8AC3E}">
-        <p14:creationId xmlns:p14="http://schemas.microsoft.com/office/powerpoint/2010/main" val="1430450449"/>
       </p:ext>
     </p:extLst>
   </p:cSld>
@@ -16285,15 +16711,6 @@
 </file>
 
 <file path=customXml/item1.xml><?xml version="1.0" encoding="utf-8"?>
-<?mso-contentType ?>
-<FormTemplates xmlns="http://schemas.microsoft.com/sharepoint/v3/contenttype/forms">
-  <Display>DocumentLibraryForm</Display>
-  <Edit>DocumentLibraryForm</Edit>
-  <New>DocumentLibraryForm</New>
-</FormTemplates>
-</file>
-
-<file path=customXml/item2.xml><?xml version="1.0" encoding="utf-8"?>
 <ct:contentTypeSchema xmlns:ct="http://schemas.microsoft.com/office/2006/metadata/contentType" xmlns:ma="http://schemas.microsoft.com/office/2006/metadata/properties/metaAttributes" ct:_="" ma:_="" ma:contentTypeName="Dokument" ma:contentTypeID="0x010100DBE362C6EE420543B698485AC74F8397" ma:contentTypeVersion="15" ma:contentTypeDescription="Ein neues Dokument erstellen." ma:contentTypeScope="" ma:versionID="ece25feff8eaf4ae94d93f45f1a09ea7">
   <xsd:schema xmlns:xsd="http://www.w3.org/2001/XMLSchema" xmlns:xs="http://www.w3.org/2001/XMLSchema" xmlns:p="http://schemas.microsoft.com/office/2006/metadata/properties" xmlns:ns2="52c83538-2338-46ef-bbce-bf2b5cdd8f3a" xmlns:ns3="3b61b577-587e-4579-bf30-e7747f8b66e7" targetNamespace="http://schemas.microsoft.com/office/2006/metadata/properties" ma:root="true" ma:fieldsID="f526c11618efe884860c9ffb4f4cafeb" ns2:_="" ns3:_="">
     <xsd:import namespace="52c83538-2338-46ef-bbce-bf2b5cdd8f3a"/>
@@ -16528,6 +16945,15 @@
 </ct:contentTypeSchema>
 </file>
 
+<file path=customXml/item2.xml><?xml version="1.0" encoding="utf-8"?>
+<?mso-contentType ?>
+<FormTemplates xmlns="http://schemas.microsoft.com/sharepoint/v3/contenttype/forms">
+  <Display>DocumentLibraryForm</Display>
+  <Edit>DocumentLibraryForm</Edit>
+  <New>DocumentLibraryForm</New>
+</FormTemplates>
+</file>
+
 <file path=customXml/item3.xml><?xml version="1.0" encoding="utf-8"?>
 <p:properties xmlns:p="http://schemas.microsoft.com/office/2006/metadata/properties" xmlns:xsi="http://www.w3.org/2001/XMLSchema-instance" xmlns:pc="http://schemas.microsoft.com/office/infopath/2007/PartnerControls">
   <documentManagement>
@@ -16540,14 +16966,6 @@
 </file>
 
 <file path=customXml/itemProps1.xml><?xml version="1.0" encoding="utf-8"?>
-<ds:datastoreItem xmlns:ds="http://schemas.openxmlformats.org/officeDocument/2006/customXml" ds:itemID="{44114351-584F-4508-AC74-29F4CFE9A81B}">
-  <ds:schemaRefs>
-    <ds:schemaRef ds:uri="http://schemas.microsoft.com/sharepoint/v3/contenttype/forms"/>
-  </ds:schemaRefs>
-</ds:datastoreItem>
-</file>
-
-<file path=customXml/itemProps2.xml><?xml version="1.0" encoding="utf-8"?>
 <ds:datastoreItem xmlns:ds="http://schemas.openxmlformats.org/officeDocument/2006/customXml" ds:itemID="{55ED3D9A-795B-4240-A56A-A7FB358B1F26}">
   <ds:schemaRefs>
     <ds:schemaRef ds:uri="http://schemas.microsoft.com/office/2006/metadata/contentType"/>
@@ -16562,6 +16980,14 @@
     <ds:schemaRef ds:uri="http://purl.org/dc/elements/1.1/"/>
     <ds:schemaRef ds:uri="http://purl.org/dc/terms/"/>
     <ds:schemaRef ds:uri="http://schemas.microsoft.com/internal/obd"/>
+  </ds:schemaRefs>
+</ds:datastoreItem>
+</file>
+
+<file path=customXml/itemProps2.xml><?xml version="1.0" encoding="utf-8"?>
+<ds:datastoreItem xmlns:ds="http://schemas.openxmlformats.org/officeDocument/2006/customXml" ds:itemID="{44114351-584F-4508-AC74-29F4CFE9A81B}">
+  <ds:schemaRefs>
+    <ds:schemaRef ds:uri="http://schemas.microsoft.com/sharepoint/v3/contenttype/forms"/>
   </ds:schemaRefs>
 </ds:datastoreItem>
 </file>

</xml_diff>